<commit_message>
add sentences which are so classic.
</commit_message>
<xml_diff>
--- a/morning reading/iridescent english sentenses.pptx
+++ b/morning reading/iridescent english sentenses.pptx
@@ -8,7 +8,7 @@
     <p:notesMasterId r:id="rId4"/>
   </p:notesMasterIdLst>
   <p:handoutMasterIdLst>
-    <p:handoutMasterId r:id="rId22"/>
+    <p:handoutMasterId r:id="rId23"/>
   </p:handoutMasterIdLst>
   <p:sldIdLst>
     <p:sldId id="256" r:id="rId3"/>
@@ -29,11 +29,12 @@
     <p:sldId id="278" r:id="rId19"/>
     <p:sldId id="279" r:id="rId20"/>
     <p:sldId id="280" r:id="rId21"/>
+    <p:sldId id="281" r:id="rId22"/>
   </p:sldIdLst>
   <p:sldSz cx="12192000" cy="6858000"/>
   <p:notesSz cx="6858000" cy="9144000"/>
   <p:custDataLst>
-    <p:tags r:id="rId26"/>
+    <p:tags r:id="rId27"/>
   </p:custDataLst>
   <p:defaultTextStyle>
     <a:defPPr rtl="0">
@@ -8441,7 +8442,11 @@
         <p:txBody>
           <a:bodyPr/>
           <a:p>
-            <a:endParaRPr lang="zh-CN" altLang="en-US"/>
+            <a:r>
+              <a:rPr lang="en-US" altLang="zh-CN"/>
+              <a:t>tai'bu'he'su</a:t>
+            </a:r>
+            <a:endParaRPr lang="en-US" altLang="zh-CN"/>
           </a:p>
         </p:txBody>
       </p:sp>
@@ -8517,7 +8522,7 @@
           <a:p>
             <a:r>
               <a:rPr lang="en-US" altLang="zh-CN"/>
-              <a:t>20190325</a:t>
+              <a:t>20190324</a:t>
             </a:r>
             <a:endParaRPr lang="en-US" altLang="zh-CN"/>
           </a:p>
@@ -8658,6 +8663,280 @@
               <a:t>》  炼金术士</a:t>
             </a:r>
             <a:endParaRPr lang="zh-CN" altLang="en-US" sz="1600"/>
+          </a:p>
+        </p:txBody>
+      </p:sp>
+      <p:sp>
+        <p:nvSpPr>
+          <p:cNvPr id="7" name="文本占位符 6"/>
+          <p:cNvSpPr>
+            <a:spLocks noGrp="1"/>
+          </p:cNvSpPr>
+          <p:nvPr>
+            <p:ph type="body" sz="quarter" idx="10"/>
+          </p:nvPr>
+        </p:nvSpPr>
+        <p:spPr/>
+        <p:txBody>
+          <a:bodyPr/>
+          <a:p>
+            <a:endParaRPr lang="zh-CN" altLang="en-US"/>
+          </a:p>
+        </p:txBody>
+      </p:sp>
+      <p:sp>
+        <p:nvSpPr>
+          <p:cNvPr id="8" name="标题 7"/>
+          <p:cNvSpPr>
+            <a:spLocks noGrp="1"/>
+          </p:cNvSpPr>
+          <p:nvPr>
+            <p:ph type="title" orient="vert"/>
+          </p:nvPr>
+        </p:nvSpPr>
+        <p:spPr/>
+        <p:txBody>
+          <a:bodyPr/>
+          <a:p>
+            <a:endParaRPr lang="zh-CN" altLang="en-US"/>
+          </a:p>
+        </p:txBody>
+      </p:sp>
+    </p:spTree>
+  </p:cSld>
+  <p:clrMapOvr>
+    <a:masterClrMapping/>
+  </p:clrMapOvr>
+</p:sld>
+</file>
+
+<file path=ppt/slides/slide19.xml><?xml version="1.0" encoding="utf-8"?>
+<p:sld xmlns:a="http://schemas.openxmlformats.org/drawingml/2006/main" xmlns:r="http://schemas.openxmlformats.org/officeDocument/2006/relationships" xmlns:p="http://schemas.openxmlformats.org/presentationml/2006/main">
+  <p:cSld>
+    <p:spTree>
+      <p:nvGrpSpPr>
+        <p:cNvPr id="1" name=""/>
+        <p:cNvGrpSpPr/>
+        <p:nvPr/>
+      </p:nvGrpSpPr>
+      <p:grpSpPr/>
+      <p:sp>
+        <p:nvSpPr>
+          <p:cNvPr id="2" name="文本占位符 1"/>
+          <p:cNvSpPr>
+            <a:spLocks noGrp="1"/>
+          </p:cNvSpPr>
+          <p:nvPr>
+            <p:ph type="body" sz="quarter" idx="15"/>
+          </p:nvPr>
+        </p:nvSpPr>
+        <p:spPr/>
+        <p:txBody>
+          <a:bodyPr/>
+          <a:p>
+            <a:endParaRPr lang="zh-CN" altLang="en-US"/>
+          </a:p>
+        </p:txBody>
+      </p:sp>
+      <p:sp>
+        <p:nvSpPr>
+          <p:cNvPr id="3" name="文本占位符 2"/>
+          <p:cNvSpPr>
+            <a:spLocks noGrp="1"/>
+          </p:cNvSpPr>
+          <p:nvPr>
+            <p:ph type="body" sz="quarter" idx="14"/>
+          </p:nvPr>
+        </p:nvSpPr>
+        <p:spPr/>
+        <p:txBody>
+          <a:bodyPr/>
+          <a:p>
+            <a:endParaRPr lang="zh-CN" altLang="en-US"/>
+          </a:p>
+        </p:txBody>
+      </p:sp>
+      <p:sp>
+        <p:nvSpPr>
+          <p:cNvPr id="4" name="文本占位符 3"/>
+          <p:cNvSpPr>
+            <a:spLocks noGrp="1"/>
+          </p:cNvSpPr>
+          <p:nvPr>
+            <p:ph type="body" sz="quarter" idx="13"/>
+          </p:nvPr>
+        </p:nvSpPr>
+        <p:spPr/>
+        <p:txBody>
+          <a:bodyPr>
+            <a:normAutofit fontScale="60000"/>
+          </a:bodyPr>
+          <a:p>
+            <a:r>
+              <a:rPr lang="en-US" altLang="zh-CN"/>
+              <a:t>20190325</a:t>
+            </a:r>
+            <a:endParaRPr lang="en-US" altLang="zh-CN"/>
+          </a:p>
+        </p:txBody>
+      </p:sp>
+      <p:sp>
+        <p:nvSpPr>
+          <p:cNvPr id="5" name="文本占位符 4"/>
+          <p:cNvSpPr>
+            <a:spLocks noGrp="1"/>
+          </p:cNvSpPr>
+          <p:nvPr>
+            <p:ph type="body" sz="quarter" idx="12"/>
+          </p:nvPr>
+        </p:nvSpPr>
+        <p:spPr/>
+        <p:txBody>
+          <a:bodyPr/>
+          <a:p>
+            <a:endParaRPr lang="zh-CN" altLang="en-US"/>
+          </a:p>
+        </p:txBody>
+      </p:sp>
+      <p:sp>
+        <p:nvSpPr>
+          <p:cNvPr id="6" name="文本占位符 5"/>
+          <p:cNvSpPr>
+            <a:spLocks noGrp="1"/>
+          </p:cNvSpPr>
+          <p:nvPr>
+            <p:ph type="body" sz="quarter" idx="11"/>
+          </p:nvPr>
+        </p:nvSpPr>
+        <p:spPr>
+          <a:xfrm>
+            <a:off x="4686300" y="207010"/>
+            <a:ext cx="6908800" cy="6434455"/>
+          </a:xfrm>
+        </p:spPr>
+        <p:txBody>
+          <a:bodyPr>
+            <a:normAutofit/>
+          </a:bodyPr>
+          <a:p>
+            <a:pPr algn="l"/>
+            <a:r>
+              <a:rPr lang="en-US" altLang="zh-CN" sz="2400"/>
+              <a:t>Great men are not born great, they grow great.</a:t>
+            </a:r>
+            <a:endParaRPr lang="en-US" altLang="zh-CN" sz="2400"/>
+          </a:p>
+          <a:p>
+            <a:pPr algn="l"/>
+            <a:r>
+              <a:rPr lang="zh-CN" altLang="en-US" sz="2400"/>
+              <a:t>伟大的人不是生下来就伟大，而是在成长过程中变得伟大。</a:t>
+            </a:r>
+            <a:endParaRPr lang="zh-CN" altLang="en-US" sz="2400"/>
+          </a:p>
+          <a:p>
+            <a:pPr algn="l"/>
+            <a:endParaRPr lang="zh-CN" altLang="en-US" sz="2400"/>
+          </a:p>
+          <a:p>
+            <a:pPr algn="l"/>
+            <a:r>
+              <a:rPr lang="zh-CN" altLang="en-US" sz="1600"/>
+              <a:t>《</a:t>
+            </a:r>
+            <a:r>
+              <a:rPr lang="en-US" altLang="zh-CN" sz="1600"/>
+              <a:t>If you don't have a passion, don't be satisfied until you find one</a:t>
+            </a:r>
+            <a:r>
+              <a:rPr lang="zh-CN" altLang="en-US" sz="1600"/>
+              <a:t>》</a:t>
+            </a:r>
+            <a:endParaRPr lang="zh-CN" altLang="en-US" sz="1600"/>
+          </a:p>
+          <a:p>
+            <a:pPr algn="l"/>
+            <a:r>
+              <a:rPr lang="en-US" altLang="zh-CN" sz="1600"/>
+              <a:t>As you begin this new stage of your life, follow your passion, if you don't have a passion, don't be satisfied until you find one. Life is too short to go through it without carrying deeply about something.</a:t>
+            </a:r>
+            <a:endParaRPr lang="en-US" altLang="zh-CN" sz="1600"/>
+          </a:p>
+          <a:p>
+            <a:pPr algn="l"/>
+            <a:r>
+              <a:rPr lang="zh-CN" altLang="en-US" sz="1600"/>
+              <a:t>当你开始生命的新阶段的时候，跟随你的激情走，要是你还没有激情，你就不要对自己满足直到发现自己的激情为止，生活毕竟是太短了，如果不深深地去爱某种东西，就这样白白过去，那就实在太不合算了。</a:t>
+            </a:r>
+            <a:endParaRPr lang="zh-CN" altLang="en-US" sz="2400"/>
+          </a:p>
+          <a:p>
+            <a:pPr algn="l"/>
+            <a:r>
+              <a:rPr lang="zh-CN" altLang="en-US" sz="2400">
+                <a:hlinkClick r:id="rId1" tooltip="" action="ppaction://hlinkfile"/>
+              </a:rPr>
+              <a:t>美能源部长</a:t>
+            </a:r>
+            <a:r>
+              <a:rPr lang="zh-CN" altLang="en-US" sz="2400" b="1">
+                <a:hlinkClick r:id="rId1" tooltip="" action="ppaction://hlinkfile"/>
+              </a:rPr>
+              <a:t>朱棣文</a:t>
+            </a:r>
+            <a:r>
+              <a:rPr lang="zh-CN" altLang="en-US" sz="2400">
+                <a:hlinkClick r:id="rId1" tooltip="" action="ppaction://hlinkfile"/>
+              </a:rPr>
+              <a:t>在哈佛大学毕业典礼上的演讲</a:t>
+            </a:r>
+            <a:endParaRPr lang="zh-CN" altLang="en-US" sz="2400">
+              <a:hlinkClick r:id="rId1" tooltip="" action="ppaction://hlinkfile"/>
+            </a:endParaRPr>
+          </a:p>
+          <a:p>
+            <a:pPr algn="l"/>
+            <a:endParaRPr lang="en-US" altLang="zh-CN" sz="2400"/>
+          </a:p>
+          <a:p>
+            <a:pPr algn="l"/>
+            <a:r>
+              <a:rPr lang="en-US" altLang="zh-CN" sz="2400"/>
+              <a:t>The time is </a:t>
+            </a:r>
+            <a:r>
+              <a:rPr lang="en-US" altLang="zh-CN" sz="2400" b="1"/>
+              <a:t>too</a:t>
+            </a:r>
+            <a:r>
+              <a:rPr lang="en-US" altLang="zh-CN" sz="2400"/>
+              <a:t> short </a:t>
+            </a:r>
+            <a:r>
+              <a:rPr lang="en-US" altLang="zh-CN" sz="2400" b="1"/>
+              <a:t>to</a:t>
+            </a:r>
+            <a:r>
+              <a:rPr lang="en-US" altLang="zh-CN" sz="2400"/>
+              <a:t> waste </a:t>
+            </a:r>
+            <a:r>
+              <a:rPr lang="en-US" altLang="zh-CN" sz="2400" b="1"/>
+              <a:t>without</a:t>
+            </a:r>
+            <a:r>
+              <a:rPr lang="en-US" altLang="zh-CN" sz="2400"/>
+              <a:t> dong something really great.</a:t>
+            </a:r>
+            <a:endParaRPr lang="en-US" altLang="zh-CN" sz="2400"/>
+          </a:p>
+          <a:p>
+            <a:pPr algn="l"/>
+            <a:r>
+              <a:rPr lang="zh-CN" altLang="en-US" sz="2400"/>
+              <a:t>时间实在是太短了，不能浪费，我们一定要做点伟大的事情。</a:t>
+            </a:r>
+            <a:endParaRPr lang="zh-CN" altLang="en-US" sz="2400"/>
           </a:p>
         </p:txBody>
       </p:sp>
@@ -9091,6 +9370,26 @@
               <a:t>》</a:t>
             </a:r>
             <a:endParaRPr lang="zh-CN" altLang="en-US" sz="2800"/>
+          </a:p>
+          <a:p>
+            <a:pPr algn="l"/>
+            <a:endParaRPr lang="zh-CN" altLang="en-US" sz="2800"/>
+          </a:p>
+          <a:p>
+            <a:pPr algn="l"/>
+            <a:r>
+              <a:rPr lang="en-US" altLang="zh-CN" sz="2800"/>
+              <a:t>A Better You</a:t>
+            </a:r>
+            <a:endParaRPr lang="en-US" altLang="zh-CN" sz="2800"/>
+          </a:p>
+          <a:p>
+            <a:pPr algn="l"/>
+            <a:r>
+              <a:rPr lang="en-US" altLang="zh-CN" sz="2800"/>
+              <a:t>A Bigger World</a:t>
+            </a:r>
+            <a:endParaRPr lang="en-US" altLang="zh-CN" sz="2800"/>
           </a:p>
         </p:txBody>
       </p:sp>

</xml_diff>

<commit_message>
add a classic sentence
</commit_message>
<xml_diff>
--- a/morning reading/iridescent english sentenses.pptx
+++ b/morning reading/iridescent english sentenses.pptx
@@ -8,7 +8,7 @@
     <p:notesMasterId r:id="rId4"/>
   </p:notesMasterIdLst>
   <p:handoutMasterIdLst>
-    <p:handoutMasterId r:id="rId29"/>
+    <p:handoutMasterId r:id="rId30"/>
   </p:handoutMasterIdLst>
   <p:sldIdLst>
     <p:sldId id="256" r:id="rId3"/>
@@ -36,11 +36,12 @@
     <p:sldId id="286" r:id="rId26"/>
     <p:sldId id="287" r:id="rId27"/>
     <p:sldId id="288" r:id="rId28"/>
+    <p:sldId id="289" r:id="rId29"/>
   </p:sldIdLst>
   <p:sldSz cx="12192000" cy="6858000"/>
   <p:notesSz cx="6858000" cy="9144000"/>
   <p:custDataLst>
-    <p:tags r:id="rId33"/>
+    <p:tags r:id="rId34"/>
   </p:custDataLst>
   <p:defaultTextStyle>
     <a:defPPr rtl="0">
@@ -10502,6 +10503,184 @@
 </p:sld>
 </file>
 
+<file path=ppt/slides/slide26.xml><?xml version="1.0" encoding="utf-8"?>
+<p:sld xmlns:a="http://schemas.openxmlformats.org/drawingml/2006/main" xmlns:r="http://schemas.openxmlformats.org/officeDocument/2006/relationships" xmlns:p="http://schemas.openxmlformats.org/presentationml/2006/main">
+  <p:cSld>
+    <p:spTree>
+      <p:nvGrpSpPr>
+        <p:cNvPr id="1" name=""/>
+        <p:cNvGrpSpPr/>
+        <p:nvPr/>
+      </p:nvGrpSpPr>
+      <p:grpSpPr/>
+      <p:sp>
+        <p:nvSpPr>
+          <p:cNvPr id="2" name="文本占位符 1"/>
+          <p:cNvSpPr>
+            <a:spLocks noGrp="1"/>
+          </p:cNvSpPr>
+          <p:nvPr>
+            <p:ph type="body" sz="quarter" idx="15"/>
+          </p:nvPr>
+        </p:nvSpPr>
+        <p:spPr/>
+        <p:txBody>
+          <a:bodyPr/>
+          <a:p>
+            <a:endParaRPr lang="zh-CN" altLang="en-US"/>
+          </a:p>
+        </p:txBody>
+      </p:sp>
+      <p:sp>
+        <p:nvSpPr>
+          <p:cNvPr id="3" name="文本占位符 2"/>
+          <p:cNvSpPr>
+            <a:spLocks noGrp="1"/>
+          </p:cNvSpPr>
+          <p:nvPr>
+            <p:ph type="body" sz="quarter" idx="14"/>
+          </p:nvPr>
+        </p:nvSpPr>
+        <p:spPr/>
+        <p:txBody>
+          <a:bodyPr/>
+          <a:p>
+            <a:endParaRPr lang="zh-CN" altLang="en-US"/>
+          </a:p>
+        </p:txBody>
+      </p:sp>
+      <p:sp>
+        <p:nvSpPr>
+          <p:cNvPr id="4" name="文本占位符 3"/>
+          <p:cNvSpPr>
+            <a:spLocks noGrp="1"/>
+          </p:cNvSpPr>
+          <p:nvPr>
+            <p:ph type="body" sz="quarter" idx="13"/>
+          </p:nvPr>
+        </p:nvSpPr>
+        <p:spPr/>
+        <p:txBody>
+          <a:bodyPr/>
+          <a:p>
+            <a:endParaRPr lang="zh-CN" altLang="en-US"/>
+          </a:p>
+        </p:txBody>
+      </p:sp>
+      <p:sp>
+        <p:nvSpPr>
+          <p:cNvPr id="5" name="文本占位符 4"/>
+          <p:cNvSpPr>
+            <a:spLocks noGrp="1"/>
+          </p:cNvSpPr>
+          <p:nvPr>
+            <p:ph type="body" sz="quarter" idx="12"/>
+          </p:nvPr>
+        </p:nvSpPr>
+        <p:spPr/>
+        <p:txBody>
+          <a:bodyPr/>
+          <a:p>
+            <a:endParaRPr lang="zh-CN" altLang="en-US"/>
+          </a:p>
+        </p:txBody>
+      </p:sp>
+      <p:sp>
+        <p:nvSpPr>
+          <p:cNvPr id="6" name="文本占位符 5"/>
+          <p:cNvSpPr>
+            <a:spLocks noGrp="1"/>
+          </p:cNvSpPr>
+          <p:nvPr>
+            <p:ph type="body" sz="quarter" idx="11"/>
+          </p:nvPr>
+        </p:nvSpPr>
+        <p:spPr>
+          <a:xfrm>
+            <a:off x="4686300" y="285115"/>
+            <a:ext cx="6908800" cy="6366510"/>
+          </a:xfrm>
+        </p:spPr>
+        <p:txBody>
+          <a:bodyPr/>
+          <a:p>
+            <a:pPr algn="l"/>
+            <a:r>
+              <a:rPr lang="en-US" altLang="zh-CN" sz="2000"/>
+              <a:t>You have to do everything you can, you have to work your hardest, and if you do, if you stay positive, you have a shot at a silver line.</a:t>
+            </a:r>
+            <a:endParaRPr lang="en-US" altLang="zh-CN" sz="2000"/>
+          </a:p>
+          <a:p>
+            <a:pPr algn="l"/>
+            <a:endParaRPr lang="en-US" altLang="zh-CN" sz="2000"/>
+          </a:p>
+          <a:p>
+            <a:pPr algn="l"/>
+            <a:r>
+              <a:rPr lang="zh-CN" altLang="en-US" sz="2000"/>
+              <a:t>你必须竭尽全力去做事情，要尽最大努力去做，只要你这么做，只要你保持乐观，你就能看见一线希望。</a:t>
+            </a:r>
+            <a:endParaRPr lang="zh-CN" altLang="en-US" sz="2000"/>
+          </a:p>
+          <a:p>
+            <a:pPr algn="l"/>
+            <a:endParaRPr lang="zh-CN" altLang="en-US" sz="2000"/>
+          </a:p>
+          <a:p>
+            <a:pPr algn="l"/>
+            <a:r>
+              <a:rPr lang="zh-CN" altLang="en-US" sz="2000"/>
+              <a:t>《乌云背后的幸福线》 电影</a:t>
+            </a:r>
+            <a:endParaRPr lang="zh-CN" altLang="en-US" sz="2000"/>
+          </a:p>
+        </p:txBody>
+      </p:sp>
+      <p:sp>
+        <p:nvSpPr>
+          <p:cNvPr id="7" name="文本占位符 6"/>
+          <p:cNvSpPr>
+            <a:spLocks noGrp="1"/>
+          </p:cNvSpPr>
+          <p:nvPr>
+            <p:ph type="body" sz="quarter" idx="10"/>
+          </p:nvPr>
+        </p:nvSpPr>
+        <p:spPr/>
+        <p:txBody>
+          <a:bodyPr/>
+          <a:p>
+            <a:endParaRPr lang="zh-CN" altLang="en-US"/>
+          </a:p>
+        </p:txBody>
+      </p:sp>
+      <p:sp>
+        <p:nvSpPr>
+          <p:cNvPr id="8" name="标题 7"/>
+          <p:cNvSpPr>
+            <a:spLocks noGrp="1"/>
+          </p:cNvSpPr>
+          <p:nvPr>
+            <p:ph type="title" orient="vert"/>
+          </p:nvPr>
+        </p:nvSpPr>
+        <p:spPr/>
+        <p:txBody>
+          <a:bodyPr/>
+          <a:p>
+            <a:endParaRPr lang="zh-CN" altLang="en-US"/>
+          </a:p>
+        </p:txBody>
+      </p:sp>
+    </p:spTree>
+  </p:cSld>
+  <p:clrMapOvr>
+    <a:masterClrMapping/>
+  </p:clrMapOvr>
+</p:sld>
+</file>
+
 <file path=ppt/slides/slide3.xml><?xml version="1.0" encoding="utf-8"?>
 <p:sld xmlns:a="http://schemas.openxmlformats.org/drawingml/2006/main" xmlns:r="http://schemas.openxmlformats.org/officeDocument/2006/relationships" xmlns:p="http://schemas.openxmlformats.org/presentationml/2006/main">
   <p:cSld>

</xml_diff>

<commit_message>
add two classic sentences
</commit_message>
<xml_diff>
--- a/morning reading/iridescent english sentenses.pptx
+++ b/morning reading/iridescent english sentenses.pptx
@@ -8,7 +8,7 @@
     <p:notesMasterId r:id="rId4"/>
   </p:notesMasterIdLst>
   <p:handoutMasterIdLst>
-    <p:handoutMasterId r:id="rId44"/>
+    <p:handoutMasterId r:id="rId46"/>
   </p:handoutMasterIdLst>
   <p:sldIdLst>
     <p:sldId id="256" r:id="rId3"/>
@@ -51,11 +51,13 @@
     <p:sldId id="302" r:id="rId41"/>
     <p:sldId id="303" r:id="rId42"/>
     <p:sldId id="304" r:id="rId43"/>
+    <p:sldId id="305" r:id="rId44"/>
+    <p:sldId id="306" r:id="rId45"/>
   </p:sldIdLst>
   <p:sldSz cx="12192000" cy="6858000"/>
   <p:notesSz cx="6858000" cy="9144000"/>
   <p:custDataLst>
-    <p:tags r:id="rId48"/>
+    <p:tags r:id="rId50"/>
   </p:custDataLst>
   <p:defaultTextStyle>
     <a:defPPr rtl="0">
@@ -14185,6 +14187,410 @@
 </p:sld>
 </file>
 
+<file path=ppt/slides/slide41.xml><?xml version="1.0" encoding="utf-8"?>
+<p:sld xmlns:a="http://schemas.openxmlformats.org/drawingml/2006/main" xmlns:r="http://schemas.openxmlformats.org/officeDocument/2006/relationships" xmlns:p="http://schemas.openxmlformats.org/presentationml/2006/main">
+  <p:cSld>
+    <p:spTree>
+      <p:nvGrpSpPr>
+        <p:cNvPr id="1" name=""/>
+        <p:cNvGrpSpPr/>
+        <p:nvPr/>
+      </p:nvGrpSpPr>
+      <p:grpSpPr/>
+      <p:sp>
+        <p:nvSpPr>
+          <p:cNvPr id="2" name="文本占位符 1"/>
+          <p:cNvSpPr>
+            <a:spLocks noGrp="1"/>
+          </p:cNvSpPr>
+          <p:nvPr>
+            <p:ph type="body" sz="quarter" idx="15"/>
+          </p:nvPr>
+        </p:nvSpPr>
+        <p:spPr/>
+        <p:txBody>
+          <a:bodyPr/>
+          <a:p>
+            <a:endParaRPr lang="zh-CN" altLang="en-US"/>
+          </a:p>
+        </p:txBody>
+      </p:sp>
+      <p:sp>
+        <p:nvSpPr>
+          <p:cNvPr id="3" name="文本占位符 2"/>
+          <p:cNvSpPr>
+            <a:spLocks noGrp="1"/>
+          </p:cNvSpPr>
+          <p:nvPr>
+            <p:ph type="body" sz="quarter" idx="14"/>
+          </p:nvPr>
+        </p:nvSpPr>
+        <p:spPr/>
+        <p:txBody>
+          <a:bodyPr/>
+          <a:p>
+            <a:endParaRPr lang="zh-CN" altLang="en-US"/>
+          </a:p>
+        </p:txBody>
+      </p:sp>
+      <p:sp>
+        <p:nvSpPr>
+          <p:cNvPr id="4" name="文本占位符 3"/>
+          <p:cNvSpPr>
+            <a:spLocks noGrp="1"/>
+          </p:cNvSpPr>
+          <p:nvPr>
+            <p:ph type="body" sz="quarter" idx="13"/>
+          </p:nvPr>
+        </p:nvSpPr>
+        <p:spPr/>
+        <p:txBody>
+          <a:bodyPr/>
+          <a:p>
+            <a:endParaRPr lang="zh-CN" altLang="en-US"/>
+          </a:p>
+        </p:txBody>
+      </p:sp>
+      <p:sp>
+        <p:nvSpPr>
+          <p:cNvPr id="5" name="文本占位符 4"/>
+          <p:cNvSpPr>
+            <a:spLocks noGrp="1"/>
+          </p:cNvSpPr>
+          <p:nvPr>
+            <p:ph type="body" sz="quarter" idx="12"/>
+          </p:nvPr>
+        </p:nvSpPr>
+        <p:spPr/>
+        <p:txBody>
+          <a:bodyPr/>
+          <a:p>
+            <a:endParaRPr lang="zh-CN" altLang="en-US"/>
+          </a:p>
+        </p:txBody>
+      </p:sp>
+      <p:sp>
+        <p:nvSpPr>
+          <p:cNvPr id="6" name="文本占位符 5"/>
+          <p:cNvSpPr>
+            <a:spLocks noGrp="1"/>
+          </p:cNvSpPr>
+          <p:nvPr>
+            <p:ph type="body" sz="quarter" idx="11"/>
+          </p:nvPr>
+        </p:nvSpPr>
+        <p:spPr>
+          <a:xfrm>
+            <a:off x="4686300" y="226060"/>
+            <a:ext cx="6908800" cy="6416040"/>
+          </a:xfrm>
+        </p:spPr>
+        <p:txBody>
+          <a:bodyPr/>
+          <a:p>
+            <a:pPr algn="l"/>
+            <a:r>
+              <a:rPr lang="en-US" altLang="zh-CN" sz="2000"/>
+              <a:t>Do all the other things, the ambitious things-travel, get rich, get famous, innovate, lead, fall in love, make and lose fortunes, swim naked in wild jungle rivers-but as you do, to the extent that you can, </a:t>
+            </a:r>
+            <a:r>
+              <a:rPr lang="en-US" altLang="zh-CN" sz="2000" b="1"/>
+              <a:t>err in the direction</a:t>
+            </a:r>
+            <a:r>
+              <a:rPr lang="en-US" altLang="zh-CN" sz="2000"/>
+              <a:t> (</a:t>
+            </a:r>
+            <a:r>
+              <a:rPr lang="zh-CN" altLang="en-US" sz="2000"/>
+              <a:t>力求</a:t>
+            </a:r>
+            <a:r>
+              <a:rPr lang="en-US" altLang="zh-CN" sz="2000"/>
+              <a:t>) of kindness.</a:t>
+            </a:r>
+            <a:endParaRPr lang="en-US" altLang="zh-CN" sz="2000"/>
+          </a:p>
+          <a:p>
+            <a:pPr algn="l"/>
+            <a:r>
+              <a:rPr lang="en-US" altLang="zh-CN" sz="2000"/>
+              <a:t>			----George Saunders </a:t>
+            </a:r>
+            <a:r>
+              <a:rPr lang="en-US" altLang="zh-CN" sz="2000" i="1"/>
+              <a:t>Kindness</a:t>
+            </a:r>
+            <a:endParaRPr lang="en-US" altLang="zh-CN" sz="2000" i="1"/>
+          </a:p>
+          <a:p>
+            <a:pPr algn="l"/>
+            <a:endParaRPr lang="en-US" altLang="zh-CN" sz="2000" i="1"/>
+          </a:p>
+          <a:p>
+            <a:pPr algn="l"/>
+            <a:r>
+              <a:rPr lang="zh-CN" altLang="en-US" sz="2000"/>
+              <a:t>去做所有你有报复的大事</a:t>
+            </a:r>
+            <a:r>
+              <a:rPr lang="en-US" altLang="zh-CN" sz="2000"/>
+              <a:t>----</a:t>
+            </a:r>
+            <a:r>
+              <a:rPr lang="zh-CN" altLang="en-US" sz="2000"/>
+              <a:t>旅行、赚钱、成名、创新、领导、坠入爱河、赚到钱赔光钱、在野生丛林的河里裸游，但在你做这些事的同时，尽你所能，力求行善。</a:t>
+            </a:r>
+            <a:endParaRPr lang="zh-CN" altLang="en-US" sz="2000"/>
+          </a:p>
+        </p:txBody>
+      </p:sp>
+      <p:sp>
+        <p:nvSpPr>
+          <p:cNvPr id="7" name="文本占位符 6"/>
+          <p:cNvSpPr>
+            <a:spLocks noGrp="1"/>
+          </p:cNvSpPr>
+          <p:nvPr>
+            <p:ph type="body" sz="quarter" idx="10"/>
+          </p:nvPr>
+        </p:nvSpPr>
+        <p:spPr/>
+        <p:txBody>
+          <a:bodyPr/>
+          <a:p>
+            <a:endParaRPr lang="zh-CN" altLang="en-US"/>
+          </a:p>
+        </p:txBody>
+      </p:sp>
+      <p:sp>
+        <p:nvSpPr>
+          <p:cNvPr id="8" name="标题 7"/>
+          <p:cNvSpPr>
+            <a:spLocks noGrp="1"/>
+          </p:cNvSpPr>
+          <p:nvPr>
+            <p:ph type="title" orient="vert"/>
+          </p:nvPr>
+        </p:nvSpPr>
+        <p:spPr/>
+        <p:txBody>
+          <a:bodyPr/>
+          <a:p>
+            <a:endParaRPr lang="zh-CN" altLang="en-US"/>
+          </a:p>
+        </p:txBody>
+      </p:sp>
+    </p:spTree>
+  </p:cSld>
+  <p:clrMapOvr>
+    <a:masterClrMapping/>
+  </p:clrMapOvr>
+</p:sld>
+</file>
+
+<file path=ppt/slides/slide42.xml><?xml version="1.0" encoding="utf-8"?>
+<p:sld xmlns:a="http://schemas.openxmlformats.org/drawingml/2006/main" xmlns:r="http://schemas.openxmlformats.org/officeDocument/2006/relationships" xmlns:p="http://schemas.openxmlformats.org/presentationml/2006/main">
+  <p:cSld>
+    <p:spTree>
+      <p:nvGrpSpPr>
+        <p:cNvPr id="1" name=""/>
+        <p:cNvGrpSpPr/>
+        <p:nvPr/>
+      </p:nvGrpSpPr>
+      <p:grpSpPr/>
+      <p:sp>
+        <p:nvSpPr>
+          <p:cNvPr id="2" name="文本占位符 1"/>
+          <p:cNvSpPr>
+            <a:spLocks noGrp="1"/>
+          </p:cNvSpPr>
+          <p:nvPr>
+            <p:ph type="body" sz="quarter" idx="15"/>
+          </p:nvPr>
+        </p:nvSpPr>
+        <p:spPr/>
+        <p:txBody>
+          <a:bodyPr/>
+          <a:p>
+            <a:endParaRPr lang="zh-CN" altLang="en-US"/>
+          </a:p>
+        </p:txBody>
+      </p:sp>
+      <p:sp>
+        <p:nvSpPr>
+          <p:cNvPr id="3" name="文本占位符 2"/>
+          <p:cNvSpPr>
+            <a:spLocks noGrp="1"/>
+          </p:cNvSpPr>
+          <p:nvPr>
+            <p:ph type="body" sz="quarter" idx="14"/>
+          </p:nvPr>
+        </p:nvSpPr>
+        <p:spPr/>
+        <p:txBody>
+          <a:bodyPr/>
+          <a:p>
+            <a:endParaRPr lang="zh-CN" altLang="en-US"/>
+          </a:p>
+        </p:txBody>
+      </p:sp>
+      <p:sp>
+        <p:nvSpPr>
+          <p:cNvPr id="4" name="文本占位符 3"/>
+          <p:cNvSpPr>
+            <a:spLocks noGrp="1"/>
+          </p:cNvSpPr>
+          <p:nvPr>
+            <p:ph type="body" sz="quarter" idx="13"/>
+          </p:nvPr>
+        </p:nvSpPr>
+        <p:spPr/>
+        <p:txBody>
+          <a:bodyPr/>
+          <a:p>
+            <a:endParaRPr lang="zh-CN" altLang="en-US"/>
+          </a:p>
+        </p:txBody>
+      </p:sp>
+      <p:sp>
+        <p:nvSpPr>
+          <p:cNvPr id="5" name="文本占位符 4"/>
+          <p:cNvSpPr>
+            <a:spLocks noGrp="1"/>
+          </p:cNvSpPr>
+          <p:nvPr>
+            <p:ph type="body" sz="quarter" idx="12"/>
+          </p:nvPr>
+        </p:nvSpPr>
+        <p:spPr/>
+        <p:txBody>
+          <a:bodyPr/>
+          <a:p>
+            <a:endParaRPr lang="zh-CN" altLang="en-US"/>
+          </a:p>
+        </p:txBody>
+      </p:sp>
+      <p:sp>
+        <p:nvSpPr>
+          <p:cNvPr id="6" name="文本占位符 5"/>
+          <p:cNvSpPr>
+            <a:spLocks noGrp="1"/>
+          </p:cNvSpPr>
+          <p:nvPr>
+            <p:ph type="body" sz="quarter" idx="11"/>
+          </p:nvPr>
+        </p:nvSpPr>
+        <p:spPr>
+          <a:xfrm>
+            <a:off x="4686300" y="149225"/>
+            <a:ext cx="6908800" cy="6570345"/>
+          </a:xfrm>
+        </p:spPr>
+        <p:txBody>
+          <a:bodyPr/>
+          <a:p>
+            <a:pPr algn="l"/>
+            <a:r>
+              <a:rPr lang="en-US" altLang="zh-CN" sz="2000"/>
+              <a:t>The only people for me are the mad ones, the ones who are mad to live, mad to talk, mad to saved, desirous of everything at the same time, the ones who never yawn or say a commonplace thing, but burn, burn, burn, like fabulous yellow Roman candles exploding </a:t>
+            </a:r>
+            <a:r>
+              <a:rPr lang="en-US" altLang="zh-CN" sz="2000" b="1"/>
+              <a:t>like spiders across the stars(</a:t>
+            </a:r>
+            <a:r>
+              <a:rPr lang="zh-CN" altLang="en-US" sz="2000" b="1"/>
+              <a:t>金星直冒</a:t>
+            </a:r>
+            <a:r>
+              <a:rPr lang="en-US" altLang="zh-CN" sz="2000" b="1"/>
+              <a:t>)</a:t>
+            </a:r>
+            <a:r>
+              <a:rPr lang="en-US" altLang="zh-CN" sz="2000"/>
+              <a:t>, and in the middle, you see the blue center-light pop, and everybody goes ahh!</a:t>
+            </a:r>
+            <a:endParaRPr lang="en-US" altLang="zh-CN" sz="2000"/>
+          </a:p>
+          <a:p>
+            <a:pPr algn="l"/>
+            <a:endParaRPr lang="en-US" altLang="zh-CN" sz="2000"/>
+          </a:p>
+          <a:p>
+            <a:pPr algn="l"/>
+            <a:r>
+              <a:rPr lang="zh-CN" altLang="en-US" sz="2000"/>
+              <a:t>《在路上》 </a:t>
+            </a:r>
+            <a:r>
+              <a:rPr lang="en-US" altLang="zh-CN" sz="2000"/>
+              <a:t>Jack Kerouac, </a:t>
+            </a:r>
+            <a:r>
+              <a:rPr lang="en-US" altLang="zh-CN" sz="2000" i="1"/>
+              <a:t>On the Road</a:t>
+            </a:r>
+            <a:endParaRPr lang="en-US" altLang="zh-CN" sz="2000" i="1"/>
+          </a:p>
+          <a:p>
+            <a:pPr algn="l"/>
+            <a:endParaRPr lang="en-US" altLang="zh-CN" sz="2000" i="1"/>
+          </a:p>
+          <a:p>
+            <a:pPr algn="l"/>
+            <a:r>
+              <a:rPr lang="zh-CN" altLang="en-US" sz="2000"/>
+              <a:t>我只喜欢一类人，他们生活狂放不羁，说起话来热情洋溢，对生活什么苛求，希望拥有一切，他们对平凡的事情不屑一顾，但他们渴望燃烧，像神话中巨型的黄色罗马蜡烛那样燃烧 ，渴望爆炸，像行星撞击那样在爆炸声中发出蓝色的光，令人惊叹不已。</a:t>
+            </a:r>
+            <a:endParaRPr lang="zh-CN" altLang="en-US" sz="2000"/>
+          </a:p>
+        </p:txBody>
+      </p:sp>
+      <p:sp>
+        <p:nvSpPr>
+          <p:cNvPr id="7" name="文本占位符 6"/>
+          <p:cNvSpPr>
+            <a:spLocks noGrp="1"/>
+          </p:cNvSpPr>
+          <p:nvPr>
+            <p:ph type="body" sz="quarter" idx="10"/>
+          </p:nvPr>
+        </p:nvSpPr>
+        <p:spPr/>
+        <p:txBody>
+          <a:bodyPr/>
+          <a:p>
+            <a:endParaRPr lang="zh-CN" altLang="en-US"/>
+          </a:p>
+        </p:txBody>
+      </p:sp>
+      <p:sp>
+        <p:nvSpPr>
+          <p:cNvPr id="8" name="标题 7"/>
+          <p:cNvSpPr>
+            <a:spLocks noGrp="1"/>
+          </p:cNvSpPr>
+          <p:nvPr>
+            <p:ph type="title" orient="vert"/>
+          </p:nvPr>
+        </p:nvSpPr>
+        <p:spPr/>
+        <p:txBody>
+          <a:bodyPr/>
+          <a:p>
+            <a:endParaRPr lang="zh-CN" altLang="en-US"/>
+          </a:p>
+        </p:txBody>
+      </p:sp>
+    </p:spTree>
+  </p:cSld>
+  <p:clrMapOvr>
+    <a:masterClrMapping/>
+  </p:clrMapOvr>
+</p:sld>
+</file>
+
 <file path=ppt/slides/slide5.xml><?xml version="1.0" encoding="utf-8"?>
 <p:sld xmlns:a="http://schemas.openxmlformats.org/drawingml/2006/main" xmlns:r="http://schemas.openxmlformats.org/officeDocument/2006/relationships" xmlns:p="http://schemas.openxmlformats.org/presentationml/2006/main">
   <p:cSld>

</xml_diff>